<commit_message>
change prez and report
</commit_message>
<xml_diff>
--- a/Презентация_ВКР_Костебелова.pptx
+++ b/Презентация_ВКР_Костебелова.pptx
@@ -9310,157 +9310,6 @@
           </a:p>
         </p:txBody>
       </p:sp>
-      <p:pic>
-        <p:nvPicPr>
-          <p:cNvPr id="5" name="Рисунок 4"/>
-          <p:cNvPicPr>
-            <a:picLocks noChangeAspect="1"/>
-          </p:cNvPicPr>
-          <p:nvPr/>
-        </p:nvPicPr>
-        <p:blipFill>
-          <a:blip r:embed="rId2">
-            <a:extLst>
-              <a:ext uri="{28A0092B-C50C-407E-A947-70E740481C1C}">
-                <a14:useLocalDpi xmlns:a14="http://schemas.microsoft.com/office/drawing/2010/main" val="0"/>
-              </a:ext>
-            </a:extLst>
-          </a:blip>
-          <a:stretch>
-            <a:fillRect/>
-          </a:stretch>
-        </p:blipFill>
-        <p:spPr>
-          <a:xfrm>
-            <a:off x="235121" y="563694"/>
-            <a:ext cx="4040317" cy="1724010"/>
-          </a:xfrm>
-          <a:prstGeom prst="rect">
-            <a:avLst/>
-          </a:prstGeom>
-        </p:spPr>
-      </p:pic>
-      <p:sp>
-        <p:nvSpPr>
-          <p:cNvPr id="7" name="Google Shape;112;p20"/>
-          <p:cNvSpPr txBox="1">
-            <a:spLocks noGrp="1"/>
-          </p:cNvSpPr>
-          <p:nvPr>
-            <p:ph type="body" idx="1"/>
-          </p:nvPr>
-        </p:nvSpPr>
-        <p:spPr>
-          <a:xfrm>
-            <a:off x="4275438" y="800277"/>
-            <a:ext cx="4672191" cy="1476615"/>
-          </a:xfrm>
-          <a:prstGeom prst="rect">
-            <a:avLst/>
-          </a:prstGeom>
-        </p:spPr>
-        <p:txBody>
-          <a:bodyPr spcFirstLastPara="1" wrap="square" lIns="91425" tIns="91425" rIns="91425" bIns="91425" anchor="t" anchorCtr="0">
-            <a:noAutofit/>
-          </a:bodyPr>
-          <a:lstStyle/>
-          <a:p>
-            <a:pPr marL="76200" lvl="0" indent="0">
-              <a:buClr>
-                <a:srgbClr val="000000"/>
-              </a:buClr>
-              <a:buSzPts val="2400"/>
-              <a:buNone/>
-            </a:pPr>
-            <a:r>
-              <a:rPr lang="en-US" sz="1600" dirty="0" smtClean="0">
-                <a:solidFill>
-                  <a:srgbClr val="000000"/>
-                </a:solidFill>
-              </a:rPr>
-              <a:t>“Real-Time Car </a:t>
-            </a:r>
-            <a:r>
-              <a:rPr lang="en-US" sz="1600" dirty="0" err="1" smtClean="0">
-                <a:solidFill>
-                  <a:srgbClr val="000000"/>
-                </a:solidFill>
-              </a:rPr>
-              <a:t>Parcing</a:t>
-            </a:r>
-            <a:r>
-              <a:rPr lang="en-US" sz="1600" dirty="0" smtClean="0">
-                <a:solidFill>
-                  <a:srgbClr val="000000"/>
-                </a:solidFill>
-              </a:rPr>
-              <a:t> Detection with Deep Learning in Different Lighting Scenarios”</a:t>
-            </a:r>
-          </a:p>
-          <a:p>
-            <a:pPr marL="76200" lvl="0" indent="0">
-              <a:buClr>
-                <a:srgbClr val="000000"/>
-              </a:buClr>
-              <a:buSzPts val="2400"/>
-              <a:buNone/>
-            </a:pPr>
-            <a:r>
-              <a:rPr lang="ru-RU" sz="1600" dirty="0" smtClean="0">
-                <a:solidFill>
-                  <a:srgbClr val="000000"/>
-                </a:solidFill>
-              </a:rPr>
-              <a:t>Авторы: </a:t>
-            </a:r>
-            <a:r>
-              <a:rPr lang="en-US" sz="1600" dirty="0" err="1" smtClean="0">
-                <a:solidFill>
-                  <a:srgbClr val="000000"/>
-                </a:solidFill>
-              </a:rPr>
-              <a:t>Fatema</a:t>
-            </a:r>
-            <a:r>
-              <a:rPr lang="en-US" sz="1600" dirty="0" smtClean="0">
-                <a:solidFill>
-                  <a:srgbClr val="000000"/>
-                </a:solidFill>
-              </a:rPr>
-              <a:t> H. Yusuf and </a:t>
-            </a:r>
-            <a:r>
-              <a:rPr lang="en-US" sz="1600" dirty="0" err="1" smtClean="0">
-                <a:solidFill>
-                  <a:srgbClr val="000000"/>
-                </a:solidFill>
-              </a:rPr>
-              <a:t>Mohab</a:t>
-            </a:r>
-            <a:r>
-              <a:rPr lang="en-US" sz="1600" dirty="0" smtClean="0">
-                <a:solidFill>
-                  <a:srgbClr val="000000"/>
-                </a:solidFill>
-              </a:rPr>
-              <a:t> A. </a:t>
-            </a:r>
-            <a:r>
-              <a:rPr lang="en-US" sz="1600" dirty="0" err="1" smtClean="0">
-                <a:solidFill>
-                  <a:srgbClr val="000000"/>
-                </a:solidFill>
-              </a:rPr>
-              <a:t>Mangoud</a:t>
-            </a:r>
-            <a:endParaRPr lang="en" sz="1600" dirty="0" smtClean="0">
-              <a:solidFill>
-                <a:srgbClr val="000000"/>
-              </a:solidFill>
-            </a:endParaRPr>
-          </a:p>
-        </p:txBody>
-      </p:sp>
       <p:sp>
         <p:nvSpPr>
           <p:cNvPr id="8" name="Прямоугольник 7"/>
@@ -9469,8 +9318,8 @@
         </p:nvSpPr>
         <p:spPr>
           <a:xfrm>
-            <a:off x="6013621" y="3988222"/>
-            <a:ext cx="3216718" cy="830997"/>
+            <a:off x="1659335" y="4981304"/>
+            <a:ext cx="6169670" cy="584775"/>
           </a:xfrm>
           <a:prstGeom prst="rect">
             <a:avLst/>
@@ -9517,14 +9366,14 @@
           <p:nvPr/>
         </p:nvPicPr>
         <p:blipFill rotWithShape="1">
-          <a:blip r:embed="rId3"/>
+          <a:blip r:embed="rId2"/>
           <a:srcRect l="2635" t="6334" r="4178" b="11678"/>
           <a:stretch/>
         </p:blipFill>
         <p:spPr>
           <a:xfrm>
-            <a:off x="-1" y="2686441"/>
-            <a:ext cx="6013621" cy="3378460"/>
+            <a:off x="896981" y="800277"/>
+            <a:ext cx="7160113" cy="4022560"/>
           </a:xfrm>
           <a:prstGeom prst="rect">
             <a:avLst/>
@@ -9539,8 +9388,8 @@
         </p:nvSpPr>
         <p:spPr>
           <a:xfrm>
-            <a:off x="2284780" y="2527976"/>
-            <a:ext cx="3216718" cy="338554"/>
+            <a:off x="3704276" y="642611"/>
+            <a:ext cx="3642761" cy="338554"/>
           </a:xfrm>
           <a:prstGeom prst="rect">
             <a:avLst/>
@@ -9669,7 +9518,31 @@
                   <a:schemeClr val="tx1"/>
                 </a:solidFill>
               </a:rPr>
-              <a:t>real:0,609s</a:t>
+              <a:t>real</a:t>
+            </a:r>
+            <a:r>
+              <a:rPr lang="en-US" dirty="0" smtClean="0">
+                <a:solidFill>
+                  <a:schemeClr val="tx1"/>
+                </a:solidFill>
+              </a:rPr>
+              <a:t>:</a:t>
+            </a:r>
+            <a:r>
+              <a:rPr lang="ru-RU" dirty="0" smtClean="0">
+                <a:solidFill>
+                  <a:schemeClr val="tx1"/>
+                </a:solidFill>
+              </a:rPr>
+              <a:t> </a:t>
+            </a:r>
+            <a:r>
+              <a:rPr lang="en-US" dirty="0" smtClean="0">
+                <a:solidFill>
+                  <a:schemeClr val="tx1"/>
+                </a:solidFill>
+              </a:rPr>
+              <a:t>0,609s</a:t>
             </a:r>
             <a:endParaRPr lang="en-US" dirty="0">
               <a:solidFill>

</xml_diff>